<commit_message>
deleteproduct for logic seq diagram added
</commit_message>
<xml_diff>
--- a/docs/diagrams/LogicComponentSequenceDiagram.pptx
+++ b/docs/diagrams/LogicComponentSequenceDiagram.pptx
@@ -126,10 +126,6 @@
 </p:presentation>
 </file>
 
-<file path=ppt/revisionInfo.xml><?xml version="1.0" encoding="utf-8"?>
-<p1510:revInfo xmlns:a="http://schemas.openxmlformats.org/drawingml/2006/main" xmlns:r="http://schemas.openxmlformats.org/officeDocument/2006/relationships" xmlns:p1510="http://schemas.microsoft.com/office/powerpoint/2015/10/main"/>
-</file>
-
 <file path=ppt/notesMasters/notesMaster1.xml><?xml version="1.0" encoding="utf-8"?>
 <p:notesMaster xmlns:a="http://schemas.openxmlformats.org/drawingml/2006/main" xmlns:r="http://schemas.openxmlformats.org/officeDocument/2006/relationships" xmlns:p="http://schemas.openxmlformats.org/presentationml/2006/main">
   <p:cSld>
@@ -212,7 +208,7 @@
           <a:p>
             <a:fld id="{F5CC4B3F-88C1-4FFA-B1B6-F41C21DC6924}" type="datetimeFigureOut">
               <a:rPr lang="en-US" smtClean="0"/>
-              <a:t>7/11/2017</a:t>
+              <a:t>11/11/18</a:t>
             </a:fld>
             <a:endParaRPr lang="en-US"/>
           </a:p>
@@ -658,7 +654,7 @@
           <a:p>
             <a:fld id="{78C97017-6FC3-485B-9764-EAC9E56C1D49}" type="datetimeFigureOut">
               <a:rPr lang="en-US" smtClean="0"/>
-              <a:t>7/11/2017</a:t>
+              <a:t>11/11/18</a:t>
             </a:fld>
             <a:endParaRPr lang="en-US"/>
           </a:p>
@@ -826,7 +822,7 @@
           <a:p>
             <a:fld id="{78C97017-6FC3-485B-9764-EAC9E56C1D49}" type="datetimeFigureOut">
               <a:rPr lang="en-US" smtClean="0"/>
-              <a:t>7/11/2017</a:t>
+              <a:t>11/11/18</a:t>
             </a:fld>
             <a:endParaRPr lang="en-US"/>
           </a:p>
@@ -1004,7 +1000,7 @@
           <a:p>
             <a:fld id="{78C97017-6FC3-485B-9764-EAC9E56C1D49}" type="datetimeFigureOut">
               <a:rPr lang="en-US" smtClean="0"/>
-              <a:t>7/11/2017</a:t>
+              <a:t>11/11/18</a:t>
             </a:fld>
             <a:endParaRPr lang="en-US"/>
           </a:p>
@@ -1172,7 +1168,7 @@
           <a:p>
             <a:fld id="{78C97017-6FC3-485B-9764-EAC9E56C1D49}" type="datetimeFigureOut">
               <a:rPr lang="en-US" smtClean="0"/>
-              <a:t>7/11/2017</a:t>
+              <a:t>11/11/18</a:t>
             </a:fld>
             <a:endParaRPr lang="en-US"/>
           </a:p>
@@ -1417,7 +1413,7 @@
           <a:p>
             <a:fld id="{78C97017-6FC3-485B-9764-EAC9E56C1D49}" type="datetimeFigureOut">
               <a:rPr lang="en-US" smtClean="0"/>
-              <a:t>7/11/2017</a:t>
+              <a:t>11/11/18</a:t>
             </a:fld>
             <a:endParaRPr lang="en-US"/>
           </a:p>
@@ -1702,7 +1698,7 @@
           <a:p>
             <a:fld id="{78C97017-6FC3-485B-9764-EAC9E56C1D49}" type="datetimeFigureOut">
               <a:rPr lang="en-US" smtClean="0"/>
-              <a:t>7/11/2017</a:t>
+              <a:t>11/11/18</a:t>
             </a:fld>
             <a:endParaRPr lang="en-US"/>
           </a:p>
@@ -2121,7 +2117,7 @@
           <a:p>
             <a:fld id="{78C97017-6FC3-485B-9764-EAC9E56C1D49}" type="datetimeFigureOut">
               <a:rPr lang="en-US" smtClean="0"/>
-              <a:t>7/11/2017</a:t>
+              <a:t>11/11/18</a:t>
             </a:fld>
             <a:endParaRPr lang="en-US"/>
           </a:p>
@@ -2238,7 +2234,7 @@
           <a:p>
             <a:fld id="{78C97017-6FC3-485B-9764-EAC9E56C1D49}" type="datetimeFigureOut">
               <a:rPr lang="en-US" smtClean="0"/>
-              <a:t>7/11/2017</a:t>
+              <a:t>11/11/18</a:t>
             </a:fld>
             <a:endParaRPr lang="en-US"/>
           </a:p>
@@ -2333,7 +2329,7 @@
           <a:p>
             <a:fld id="{78C97017-6FC3-485B-9764-EAC9E56C1D49}" type="datetimeFigureOut">
               <a:rPr lang="en-US" smtClean="0"/>
-              <a:t>7/11/2017</a:t>
+              <a:t>11/11/18</a:t>
             </a:fld>
             <a:endParaRPr lang="en-US"/>
           </a:p>
@@ -2608,7 +2604,7 @@
           <a:p>
             <a:fld id="{78C97017-6FC3-485B-9764-EAC9E56C1D49}" type="datetimeFigureOut">
               <a:rPr lang="en-US" smtClean="0"/>
-              <a:t>7/11/2017</a:t>
+              <a:t>11/11/18</a:t>
             </a:fld>
             <a:endParaRPr lang="en-US"/>
           </a:p>
@@ -2860,7 +2856,7 @@
           <a:p>
             <a:fld id="{78C97017-6FC3-485B-9764-EAC9E56C1D49}" type="datetimeFigureOut">
               <a:rPr lang="en-US" smtClean="0"/>
-              <a:t>7/11/2017</a:t>
+              <a:t>11/11/18</a:t>
             </a:fld>
             <a:endParaRPr lang="en-US"/>
           </a:p>
@@ -3071,7 +3067,7 @@
           <a:p>
             <a:fld id="{78C97017-6FC3-485B-9764-EAC9E56C1D49}" type="datetimeFigureOut">
               <a:rPr lang="en-US" smtClean="0"/>
-              <a:t>7/11/2017</a:t>
+              <a:t>11/11/18</a:t>
             </a:fld>
             <a:endParaRPr lang="en-US"/>
           </a:p>
@@ -3446,2025 +3442,42 @@
           <a:chExt cx="0" cy="0"/>
         </a:xfrm>
       </p:grpSpPr>
-      <p:sp>
-        <p:nvSpPr>
-          <p:cNvPr id="81" name="Rectangle 65"/>
-          <p:cNvSpPr/>
+      <p:pic>
+        <p:nvPicPr>
+          <p:cNvPr id="7" name="Picture 6">
+            <a:extLst>
+              <a:ext uri="{FF2B5EF4-FFF2-40B4-BE49-F238E27FC236}">
+                <a16:creationId xmlns:a16="http://schemas.microsoft.com/office/drawing/2014/main" id="{A3D0356A-F3BE-6B46-8C02-810BB08E0B89}"/>
+              </a:ext>
+            </a:extLst>
+          </p:cNvPr>
+          <p:cNvPicPr>
+            <a:picLocks noChangeAspect="1"/>
+          </p:cNvPicPr>
           <p:nvPr/>
-        </p:nvSpPr>
+        </p:nvPicPr>
+        <p:blipFill>
+          <a:blip r:embed="rId2">
+            <a:extLst>
+              <a:ext uri="{28A0092B-C50C-407E-A947-70E740481C1C}">
+                <a14:useLocalDpi xmlns:a14="http://schemas.microsoft.com/office/drawing/2010/main" val="0"/>
+              </a:ext>
+            </a:extLst>
+          </a:blip>
+          <a:stretch>
+            <a:fillRect/>
+          </a:stretch>
+        </p:blipFill>
         <p:spPr>
           <a:xfrm>
-            <a:off x="685800" y="1981200"/>
-            <a:ext cx="7252956" cy="4000286"/>
-          </a:xfrm>
-          <a:prstGeom prst="roundRect">
-            <a:avLst>
-              <a:gd name="adj" fmla="val 3484"/>
-            </a:avLst>
-          </a:prstGeom>
-          <a:solidFill>
-            <a:schemeClr val="accent1">
-              <a:lumMod val="20000"/>
-              <a:lumOff val="80000"/>
-            </a:schemeClr>
-          </a:solidFill>
-          <a:ln w="19050">
-            <a:noFill/>
-          </a:ln>
-          <a:effectLst/>
-        </p:spPr>
-        <p:style>
-          <a:lnRef idx="1">
-            <a:schemeClr val="accent2"/>
-          </a:lnRef>
-          <a:fillRef idx="2">
-            <a:schemeClr val="accent2"/>
-          </a:fillRef>
-          <a:effectRef idx="1">
-            <a:schemeClr val="accent2"/>
-          </a:effectRef>
-          <a:fontRef idx="minor">
-            <a:schemeClr val="dk1"/>
-          </a:fontRef>
-        </p:style>
-        <p:txBody>
-          <a:bodyPr rtlCol="0" anchor="t"/>
-          <a:lstStyle/>
-          <a:p>
-            <a:r>
-              <a:rPr lang="en-US" sz="1200" b="1" dirty="0">
-                <a:solidFill>
-                  <a:srgbClr val="0070C0"/>
-                </a:solidFill>
-              </a:rPr>
-              <a:t>Logic</a:t>
-            </a:r>
-            <a:endParaRPr lang="en-SG" sz="1200" b="1" dirty="0">
-              <a:solidFill>
-                <a:srgbClr val="0070C0"/>
-              </a:solidFill>
-            </a:endParaRPr>
-          </a:p>
-        </p:txBody>
-      </p:sp>
-      <p:sp>
-        <p:nvSpPr>
-          <p:cNvPr id="2" name="Rectangle 62"/>
-          <p:cNvSpPr/>
-          <p:nvPr/>
-        </p:nvSpPr>
-        <p:spPr>
-          <a:xfrm>
-            <a:off x="845045" y="2296546"/>
-            <a:ext cx="1455629" cy="346760"/>
+            <a:off x="345537" y="1257300"/>
+            <a:ext cx="8452925" cy="4343400"/>
           </a:xfrm>
           <a:prstGeom prst="rect">
             <a:avLst/>
           </a:prstGeom>
-          <a:solidFill>
-            <a:srgbClr val="0070C0"/>
-          </a:solidFill>
-          <a:ln w="19050">
-            <a:solidFill>
-              <a:srgbClr val="0070C0"/>
-            </a:solidFill>
-          </a:ln>
-          <a:effectLst/>
         </p:spPr>
-        <p:style>
-          <a:lnRef idx="1">
-            <a:schemeClr val="accent2"/>
-          </a:lnRef>
-          <a:fillRef idx="2">
-            <a:schemeClr val="accent2"/>
-          </a:fillRef>
-          <a:effectRef idx="1">
-            <a:schemeClr val="accent2"/>
-          </a:effectRef>
-          <a:fontRef idx="minor">
-            <a:schemeClr val="dk1"/>
-          </a:fontRef>
-        </p:style>
-        <p:txBody>
-          <a:bodyPr rtlCol="0" anchor="ctr"/>
-          <a:lstStyle/>
-          <a:p>
-            <a:pPr algn="ctr"/>
-            <a:r>
-              <a:rPr lang="en-US" sz="1600" dirty="0">
-                <a:solidFill>
-                  <a:schemeClr val="bg1"/>
-                </a:solidFill>
-              </a:rPr>
-              <a:t>:</a:t>
-            </a:r>
-            <a:r>
-              <a:rPr lang="en-US" sz="1600" dirty="0" err="1">
-                <a:solidFill>
-                  <a:schemeClr val="bg1"/>
-                </a:solidFill>
-              </a:rPr>
-              <a:t>LogicManager</a:t>
-            </a:r>
-            <a:endParaRPr lang="en-SG" sz="1600" dirty="0">
-              <a:solidFill>
-                <a:schemeClr val="bg1"/>
-              </a:solidFill>
-            </a:endParaRPr>
-          </a:p>
-        </p:txBody>
-      </p:sp>
-      <p:cxnSp>
-        <p:nvCxnSpPr>
-          <p:cNvPr id="5" name="Straight Connector 4"/>
-          <p:cNvCxnSpPr/>
-          <p:nvPr/>
-        </p:nvCxnSpPr>
-        <p:spPr>
-          <a:xfrm>
-            <a:off x="1572859" y="2660217"/>
-            <a:ext cx="0" cy="2597583"/>
-          </a:xfrm>
-          <a:prstGeom prst="line">
-            <a:avLst/>
-          </a:prstGeom>
-          <a:ln w="19050">
-            <a:solidFill>
-              <a:srgbClr val="0070C0"/>
-            </a:solidFill>
-            <a:prstDash val="sysDash"/>
-          </a:ln>
-          <a:effectLst/>
-        </p:spPr>
-        <p:style>
-          <a:lnRef idx="1">
-            <a:schemeClr val="accent1"/>
-          </a:lnRef>
-          <a:fillRef idx="2">
-            <a:schemeClr val="accent1"/>
-          </a:fillRef>
-          <a:effectRef idx="1">
-            <a:schemeClr val="accent1"/>
-          </a:effectRef>
-          <a:fontRef idx="minor">
-            <a:schemeClr val="dk1"/>
-          </a:fontRef>
-        </p:style>
-      </p:cxnSp>
-      <p:sp>
-        <p:nvSpPr>
-          <p:cNvPr id="6" name="Rectangle 5"/>
-          <p:cNvSpPr/>
-          <p:nvPr/>
-        </p:nvSpPr>
-        <p:spPr>
-          <a:xfrm>
-            <a:off x="1500851" y="3010911"/>
-            <a:ext cx="152400" cy="2780287"/>
-          </a:xfrm>
-          <a:prstGeom prst="rect">
-            <a:avLst/>
-          </a:prstGeom>
-          <a:solidFill>
-            <a:srgbClr val="0070C0"/>
-          </a:solidFill>
-          <a:ln>
-            <a:solidFill>
-              <a:srgbClr val="0070C0"/>
-            </a:solidFill>
-          </a:ln>
-          <a:effectLst/>
-        </p:spPr>
-        <p:style>
-          <a:lnRef idx="1">
-            <a:schemeClr val="accent3"/>
-          </a:lnRef>
-          <a:fillRef idx="2">
-            <a:schemeClr val="accent3"/>
-          </a:fillRef>
-          <a:effectRef idx="1">
-            <a:schemeClr val="accent3"/>
-          </a:effectRef>
-          <a:fontRef idx="minor">
-            <a:schemeClr val="dk1"/>
-          </a:fontRef>
-        </p:style>
-        <p:txBody>
-          <a:bodyPr rtlCol="0" anchor="ctr"/>
-          <a:lstStyle/>
-          <a:p>
-            <a:pPr algn="ctr"/>
-            <a:endParaRPr lang="en-SG" sz="1400"/>
-          </a:p>
-        </p:txBody>
-      </p:sp>
-      <p:sp>
-        <p:nvSpPr>
-          <p:cNvPr id="16" name="Rectangle 62"/>
-          <p:cNvSpPr/>
-          <p:nvPr/>
-        </p:nvSpPr>
-        <p:spPr>
-          <a:xfrm>
-            <a:off x="2743200" y="2179309"/>
-            <a:ext cx="1219200" cy="467684"/>
-          </a:xfrm>
-          <a:prstGeom prst="rect">
-            <a:avLst/>
-          </a:prstGeom>
-          <a:solidFill>
-            <a:srgbClr val="0070C0"/>
-          </a:solidFill>
-          <a:ln w="19050">
-            <a:solidFill>
-              <a:srgbClr val="0070C0"/>
-            </a:solidFill>
-          </a:ln>
-          <a:effectLst/>
-        </p:spPr>
-        <p:style>
-          <a:lnRef idx="1">
-            <a:schemeClr val="accent2"/>
-          </a:lnRef>
-          <a:fillRef idx="2">
-            <a:schemeClr val="accent2"/>
-          </a:fillRef>
-          <a:effectRef idx="1">
-            <a:schemeClr val="accent2"/>
-          </a:effectRef>
-          <a:fontRef idx="minor">
-            <a:schemeClr val="dk1"/>
-          </a:fontRef>
-        </p:style>
-        <p:txBody>
-          <a:bodyPr rtlCol="0" anchor="ctr"/>
-          <a:lstStyle/>
-          <a:p>
-            <a:pPr algn="ctr"/>
-            <a:r>
-              <a:rPr lang="en-US" sz="1600" dirty="0">
-                <a:solidFill>
-                  <a:schemeClr val="bg1"/>
-                </a:solidFill>
-              </a:rPr>
-              <a:t>:Address</a:t>
-            </a:r>
-          </a:p>
-          <a:p>
-            <a:pPr algn="ctr"/>
-            <a:r>
-              <a:rPr lang="en-US" sz="1600" dirty="0" err="1">
-                <a:solidFill>
-                  <a:schemeClr val="bg1"/>
-                </a:solidFill>
-              </a:rPr>
-              <a:t>BookParser</a:t>
-            </a:r>
-            <a:endParaRPr lang="en-SG" sz="1600" dirty="0">
-              <a:solidFill>
-                <a:schemeClr val="bg1"/>
-              </a:solidFill>
-            </a:endParaRPr>
-          </a:p>
-        </p:txBody>
-      </p:sp>
-      <p:cxnSp>
-        <p:nvCxnSpPr>
-          <p:cNvPr id="17" name="Straight Connector 16"/>
-          <p:cNvCxnSpPr/>
-          <p:nvPr/>
-        </p:nvCxnSpPr>
-        <p:spPr>
-          <a:xfrm>
-            <a:off x="3356599" y="2663904"/>
-            <a:ext cx="0" cy="1695374"/>
-          </a:xfrm>
-          <a:prstGeom prst="line">
-            <a:avLst/>
-          </a:prstGeom>
-          <a:ln w="19050">
-            <a:solidFill>
-              <a:srgbClr val="0070C0"/>
-            </a:solidFill>
-            <a:prstDash val="sysDash"/>
-          </a:ln>
-          <a:effectLst/>
-        </p:spPr>
-        <p:style>
-          <a:lnRef idx="1">
-            <a:schemeClr val="accent1"/>
-          </a:lnRef>
-          <a:fillRef idx="2">
-            <a:schemeClr val="accent1"/>
-          </a:fillRef>
-          <a:effectRef idx="1">
-            <a:schemeClr val="accent1"/>
-          </a:effectRef>
-          <a:fontRef idx="minor">
-            <a:schemeClr val="dk1"/>
-          </a:fontRef>
-        </p:style>
-      </p:cxnSp>
-      <p:sp>
-        <p:nvSpPr>
-          <p:cNvPr id="18" name="Rectangle 17"/>
-          <p:cNvSpPr/>
-          <p:nvPr/>
-        </p:nvSpPr>
-        <p:spPr>
-          <a:xfrm>
-            <a:off x="3284590" y="3122096"/>
-            <a:ext cx="174929" cy="1129459"/>
-          </a:xfrm>
-          <a:prstGeom prst="rect">
-            <a:avLst/>
-          </a:prstGeom>
-          <a:solidFill>
-            <a:srgbClr val="0070C0"/>
-          </a:solidFill>
-          <a:ln>
-            <a:solidFill>
-              <a:srgbClr val="0070C0"/>
-            </a:solidFill>
-          </a:ln>
-          <a:effectLst/>
-        </p:spPr>
-        <p:style>
-          <a:lnRef idx="1">
-            <a:schemeClr val="accent3"/>
-          </a:lnRef>
-          <a:fillRef idx="2">
-            <a:schemeClr val="accent3"/>
-          </a:fillRef>
-          <a:effectRef idx="1">
-            <a:schemeClr val="accent3"/>
-          </a:effectRef>
-          <a:fontRef idx="minor">
-            <a:schemeClr val="dk1"/>
-          </a:fontRef>
-        </p:style>
-        <p:txBody>
-          <a:bodyPr rtlCol="0" anchor="ctr"/>
-          <a:lstStyle/>
-          <a:p>
-            <a:pPr algn="ctr"/>
-            <a:endParaRPr lang="en-SG" sz="1400">
-              <a:solidFill>
-                <a:schemeClr val="dk1"/>
-              </a:solidFill>
-            </a:endParaRPr>
-          </a:p>
-        </p:txBody>
-      </p:sp>
-      <p:sp>
-        <p:nvSpPr>
-          <p:cNvPr id="19" name="Rectangle 62"/>
-          <p:cNvSpPr/>
-          <p:nvPr/>
-        </p:nvSpPr>
-        <p:spPr>
-          <a:xfrm>
-            <a:off x="6221565" y="3312740"/>
-            <a:ext cx="1093635" cy="461538"/>
-          </a:xfrm>
-          <a:prstGeom prst="rect">
-            <a:avLst/>
-          </a:prstGeom>
-          <a:solidFill>
-            <a:srgbClr val="0070C0"/>
-          </a:solidFill>
-          <a:ln w="19050">
-            <a:solidFill>
-              <a:srgbClr val="0070C0"/>
-            </a:solidFill>
-          </a:ln>
-          <a:effectLst/>
-        </p:spPr>
-        <p:style>
-          <a:lnRef idx="1">
-            <a:schemeClr val="accent2"/>
-          </a:lnRef>
-          <a:fillRef idx="2">
-            <a:schemeClr val="accent2"/>
-          </a:fillRef>
-          <a:effectRef idx="1">
-            <a:schemeClr val="accent2"/>
-          </a:effectRef>
-          <a:fontRef idx="minor">
-            <a:schemeClr val="dk1"/>
-          </a:fontRef>
-        </p:style>
-        <p:txBody>
-          <a:bodyPr rtlCol="0" anchor="ctr"/>
-          <a:lstStyle/>
-          <a:p>
-            <a:pPr algn="ctr"/>
-            <a:r>
-              <a:rPr lang="en-US" sz="1600" dirty="0">
-                <a:solidFill>
-                  <a:schemeClr val="bg1"/>
-                </a:solidFill>
-              </a:rPr>
-              <a:t>d:Delete</a:t>
-            </a:r>
-            <a:br>
-              <a:rPr lang="en-US" sz="1600" dirty="0">
-                <a:solidFill>
-                  <a:schemeClr val="bg1"/>
-                </a:solidFill>
-              </a:rPr>
-            </a:br>
-            <a:r>
-              <a:rPr lang="en-US" sz="1600" dirty="0">
-                <a:solidFill>
-                  <a:schemeClr val="bg1"/>
-                </a:solidFill>
-              </a:rPr>
-              <a:t>Command</a:t>
-            </a:r>
-            <a:endParaRPr lang="en-SG" sz="1600" dirty="0">
-              <a:solidFill>
-                <a:schemeClr val="bg1"/>
-              </a:solidFill>
-            </a:endParaRPr>
-          </a:p>
-        </p:txBody>
-      </p:sp>
-      <p:cxnSp>
-        <p:nvCxnSpPr>
-          <p:cNvPr id="20" name="Straight Connector 19"/>
-          <p:cNvCxnSpPr>
-            <a:stCxn id="21" idx="0"/>
-          </p:cNvCxnSpPr>
-          <p:nvPr/>
-        </p:nvCxnSpPr>
-        <p:spPr>
-          <a:xfrm>
-            <a:off x="6772574" y="3774278"/>
-            <a:ext cx="0" cy="1940722"/>
-          </a:xfrm>
-          <a:prstGeom prst="line">
-            <a:avLst/>
-          </a:prstGeom>
-          <a:ln w="19050">
-            <a:solidFill>
-              <a:srgbClr val="0070C0"/>
-            </a:solidFill>
-            <a:prstDash val="sysDash"/>
-          </a:ln>
-          <a:effectLst/>
-        </p:spPr>
-        <p:style>
-          <a:lnRef idx="1">
-            <a:schemeClr val="accent1"/>
-          </a:lnRef>
-          <a:fillRef idx="2">
-            <a:schemeClr val="accent1"/>
-          </a:fillRef>
-          <a:effectRef idx="1">
-            <a:schemeClr val="accent1"/>
-          </a:effectRef>
-          <a:fontRef idx="minor">
-            <a:schemeClr val="dk1"/>
-          </a:fontRef>
-        </p:style>
-      </p:cxnSp>
-      <p:sp>
-        <p:nvSpPr>
-          <p:cNvPr id="21" name="Rectangle 20"/>
-          <p:cNvSpPr/>
-          <p:nvPr/>
-        </p:nvSpPr>
-        <p:spPr>
-          <a:xfrm>
-            <a:off x="6696374" y="3774278"/>
-            <a:ext cx="152400" cy="276003"/>
-          </a:xfrm>
-          <a:prstGeom prst="rect">
-            <a:avLst/>
-          </a:prstGeom>
-          <a:solidFill>
-            <a:srgbClr val="0070C0"/>
-          </a:solidFill>
-          <a:ln>
-            <a:solidFill>
-              <a:srgbClr val="0070C0"/>
-            </a:solidFill>
-          </a:ln>
-          <a:effectLst/>
-        </p:spPr>
-        <p:style>
-          <a:lnRef idx="1">
-            <a:schemeClr val="accent3"/>
-          </a:lnRef>
-          <a:fillRef idx="2">
-            <a:schemeClr val="accent3"/>
-          </a:fillRef>
-          <a:effectRef idx="1">
-            <a:schemeClr val="accent3"/>
-          </a:effectRef>
-          <a:fontRef idx="minor">
-            <a:schemeClr val="dk1"/>
-          </a:fontRef>
-        </p:style>
-        <p:txBody>
-          <a:bodyPr rtlCol="0" anchor="ctr"/>
-          <a:lstStyle/>
-          <a:p>
-            <a:pPr algn="ctr"/>
-            <a:endParaRPr lang="en-SG" sz="1400"/>
-          </a:p>
-        </p:txBody>
-      </p:sp>
-      <p:cxnSp>
-        <p:nvCxnSpPr>
-          <p:cNvPr id="23" name="Straight Arrow Connector 22"/>
-          <p:cNvCxnSpPr/>
-          <p:nvPr/>
-        </p:nvCxnSpPr>
-        <p:spPr>
-          <a:xfrm>
-            <a:off x="381000" y="3014599"/>
-            <a:ext cx="1119851" cy="0"/>
-          </a:xfrm>
-          <a:prstGeom prst="straightConnector1">
-            <a:avLst/>
-          </a:prstGeom>
-          <a:ln w="19050">
-            <a:solidFill>
-              <a:srgbClr val="00B050"/>
-            </a:solidFill>
-            <a:tailEnd type="arrow"/>
-          </a:ln>
-        </p:spPr>
-        <p:style>
-          <a:lnRef idx="1">
-            <a:schemeClr val="accent1"/>
-          </a:lnRef>
-          <a:fillRef idx="0">
-            <a:schemeClr val="accent1"/>
-          </a:fillRef>
-          <a:effectRef idx="0">
-            <a:schemeClr val="accent1"/>
-          </a:effectRef>
-          <a:fontRef idx="minor">
-            <a:schemeClr val="tx1"/>
-          </a:fontRef>
-        </p:style>
-      </p:cxnSp>
-      <p:cxnSp>
-        <p:nvCxnSpPr>
-          <p:cNvPr id="25" name="Straight Arrow Connector 24"/>
-          <p:cNvCxnSpPr/>
-          <p:nvPr/>
-        </p:nvCxnSpPr>
-        <p:spPr>
-          <a:xfrm flipV="1">
-            <a:off x="1653251" y="3122097"/>
-            <a:ext cx="1596514" cy="1"/>
-          </a:xfrm>
-          <a:prstGeom prst="straightConnector1">
-            <a:avLst/>
-          </a:prstGeom>
-          <a:ln w="19050">
-            <a:solidFill>
-              <a:srgbClr val="0070C0"/>
-            </a:solidFill>
-            <a:tailEnd type="arrow"/>
-          </a:ln>
-        </p:spPr>
-        <p:style>
-          <a:lnRef idx="1">
-            <a:schemeClr val="accent1"/>
-          </a:lnRef>
-          <a:fillRef idx="0">
-            <a:schemeClr val="accent1"/>
-          </a:fillRef>
-          <a:effectRef idx="0">
-            <a:schemeClr val="accent1"/>
-          </a:effectRef>
-          <a:fontRef idx="minor">
-            <a:schemeClr val="tx1"/>
-          </a:fontRef>
-        </p:style>
-      </p:cxnSp>
-      <p:sp>
-        <p:nvSpPr>
-          <p:cNvPr id="26" name="TextBox 25"/>
-          <p:cNvSpPr txBox="1"/>
-          <p:nvPr/>
-        </p:nvSpPr>
-        <p:spPr>
-          <a:xfrm>
-            <a:off x="0" y="2743200"/>
-            <a:ext cx="1424846" cy="215444"/>
-          </a:xfrm>
-          <a:prstGeom prst="rect">
-            <a:avLst/>
-          </a:prstGeom>
-          <a:noFill/>
-        </p:spPr>
-        <p:txBody>
-          <a:bodyPr wrap="square" lIns="0" tIns="0" rIns="0" bIns="0" rtlCol="0">
-            <a:spAutoFit/>
-          </a:bodyPr>
-          <a:lstStyle/>
-          <a:p>
-            <a:pPr algn="r"/>
-            <a:r>
-              <a:rPr lang="en-US" sz="1400" dirty="0">
-                <a:solidFill>
-                  <a:srgbClr val="0070C0"/>
-                </a:solidFill>
-              </a:rPr>
-              <a:t>execute(“delete 1”)</a:t>
-            </a:r>
-          </a:p>
-        </p:txBody>
-      </p:sp>
-      <p:cxnSp>
-        <p:nvCxnSpPr>
-          <p:cNvPr id="28" name="Straight Arrow Connector 27"/>
-          <p:cNvCxnSpPr/>
-          <p:nvPr/>
-        </p:nvCxnSpPr>
-        <p:spPr>
-          <a:xfrm flipV="1">
-            <a:off x="5257218" y="3703214"/>
-            <a:ext cx="922392" cy="1"/>
-          </a:xfrm>
-          <a:prstGeom prst="straightConnector1">
-            <a:avLst/>
-          </a:prstGeom>
-          <a:ln w="19050">
-            <a:solidFill>
-              <a:srgbClr val="0070C0"/>
-            </a:solidFill>
-            <a:tailEnd type="arrow"/>
-          </a:ln>
-        </p:spPr>
-        <p:style>
-          <a:lnRef idx="1">
-            <a:schemeClr val="accent1"/>
-          </a:lnRef>
-          <a:fillRef idx="0">
-            <a:schemeClr val="accent1"/>
-          </a:fillRef>
-          <a:effectRef idx="0">
-            <a:schemeClr val="accent1"/>
-          </a:effectRef>
-          <a:fontRef idx="minor">
-            <a:schemeClr val="tx1"/>
-          </a:fontRef>
-        </p:style>
-      </p:cxnSp>
-      <p:sp>
-        <p:nvSpPr>
-          <p:cNvPr id="29" name="TextBox 28"/>
-          <p:cNvSpPr txBox="1"/>
-          <p:nvPr/>
-        </p:nvSpPr>
-        <p:spPr>
-          <a:xfrm>
-            <a:off x="4257582" y="4251556"/>
-            <a:ext cx="855809" cy="215444"/>
-          </a:xfrm>
-          <a:prstGeom prst="rect">
-            <a:avLst/>
-          </a:prstGeom>
-          <a:noFill/>
-        </p:spPr>
-        <p:txBody>
-          <a:bodyPr wrap="square" lIns="0" tIns="0" rIns="0" bIns="0" rtlCol="0">
-            <a:spAutoFit/>
-          </a:bodyPr>
-          <a:lstStyle>
-            <a:defPPr>
-              <a:defRPr lang="en-US"/>
-            </a:defPPr>
-            <a:lvl1pPr algn="r">
-              <a:defRPr sz="1400">
-                <a:solidFill>
-                  <a:srgbClr val="0070C0"/>
-                </a:solidFill>
-              </a:defRPr>
-            </a:lvl1pPr>
-          </a:lstStyle>
-          <a:p>
-            <a:r>
-              <a:rPr lang="en-US" dirty="0"/>
-              <a:t>execute()</a:t>
-            </a:r>
-          </a:p>
-        </p:txBody>
-      </p:sp>
-      <p:cxnSp>
-        <p:nvCxnSpPr>
-          <p:cNvPr id="34" name="Straight Arrow Connector 33"/>
-          <p:cNvCxnSpPr/>
-          <p:nvPr/>
-        </p:nvCxnSpPr>
-        <p:spPr>
-          <a:xfrm>
-            <a:off x="5257800" y="4050281"/>
-            <a:ext cx="1492974" cy="0"/>
-          </a:xfrm>
-          <a:prstGeom prst="straightConnector1">
-            <a:avLst/>
-          </a:prstGeom>
-          <a:ln w="19050">
-            <a:solidFill>
-              <a:srgbClr val="0070C0"/>
-            </a:solidFill>
-            <a:prstDash val="sysDash"/>
-            <a:headEnd type="arrow" w="med" len="med"/>
-            <a:tailEnd type="none" w="med" len="med"/>
-          </a:ln>
-        </p:spPr>
-        <p:style>
-          <a:lnRef idx="1">
-            <a:schemeClr val="accent1"/>
-          </a:lnRef>
-          <a:fillRef idx="0">
-            <a:schemeClr val="accent1"/>
-          </a:fillRef>
-          <a:effectRef idx="0">
-            <a:schemeClr val="accent1"/>
-          </a:effectRef>
-          <a:fontRef idx="minor">
-            <a:schemeClr val="tx1"/>
-          </a:fontRef>
-        </p:style>
-      </p:cxnSp>
-      <p:cxnSp>
-        <p:nvCxnSpPr>
-          <p:cNvPr id="35" name="Straight Arrow Connector 34"/>
-          <p:cNvCxnSpPr/>
-          <p:nvPr/>
-        </p:nvCxnSpPr>
-        <p:spPr>
-          <a:xfrm flipV="1">
-            <a:off x="1670186" y="4243231"/>
-            <a:ext cx="1596514" cy="5378"/>
-          </a:xfrm>
-          <a:prstGeom prst="straightConnector1">
-            <a:avLst/>
-          </a:prstGeom>
-          <a:ln w="19050">
-            <a:solidFill>
-              <a:srgbClr val="0070C0"/>
-            </a:solidFill>
-            <a:prstDash val="sysDash"/>
-            <a:headEnd type="arrow" w="med" len="med"/>
-            <a:tailEnd type="none" w="med" len="med"/>
-          </a:ln>
-        </p:spPr>
-        <p:style>
-          <a:lnRef idx="1">
-            <a:schemeClr val="accent1"/>
-          </a:lnRef>
-          <a:fillRef idx="0">
-            <a:schemeClr val="accent1"/>
-          </a:fillRef>
-          <a:effectRef idx="0">
-            <a:schemeClr val="accent1"/>
-          </a:effectRef>
-          <a:fontRef idx="minor">
-            <a:schemeClr val="tx1"/>
-          </a:fontRef>
-        </p:style>
-      </p:cxnSp>
-      <p:cxnSp>
-        <p:nvCxnSpPr>
-          <p:cNvPr id="37" name="Straight Arrow Connector 36"/>
-          <p:cNvCxnSpPr/>
-          <p:nvPr/>
-        </p:nvCxnSpPr>
-        <p:spPr>
-          <a:xfrm>
-            <a:off x="304800" y="5791200"/>
-            <a:ext cx="1196051" cy="0"/>
-          </a:xfrm>
-          <a:prstGeom prst="straightConnector1">
-            <a:avLst/>
-          </a:prstGeom>
-          <a:ln w="19050">
-            <a:solidFill>
-              <a:schemeClr val="accent1"/>
-            </a:solidFill>
-            <a:prstDash val="sysDash"/>
-            <a:headEnd type="arrow" w="med" len="med"/>
-            <a:tailEnd type="none" w="med" len="med"/>
-          </a:ln>
-        </p:spPr>
-        <p:style>
-          <a:lnRef idx="1">
-            <a:schemeClr val="accent1"/>
-          </a:lnRef>
-          <a:fillRef idx="0">
-            <a:schemeClr val="accent1"/>
-          </a:fillRef>
-          <a:effectRef idx="0">
-            <a:schemeClr val="accent1"/>
-          </a:effectRef>
-          <a:fontRef idx="minor">
-            <a:schemeClr val="tx1"/>
-          </a:fontRef>
-        </p:style>
-      </p:cxnSp>
-      <p:sp>
-        <p:nvSpPr>
-          <p:cNvPr id="39" name="Rectangle 62"/>
-          <p:cNvSpPr/>
-          <p:nvPr/>
-        </p:nvSpPr>
-        <p:spPr>
-          <a:xfrm>
-            <a:off x="8265896" y="2362200"/>
-            <a:ext cx="1030504" cy="346760"/>
-          </a:xfrm>
-          <a:prstGeom prst="rect">
-            <a:avLst/>
-          </a:prstGeom>
-          <a:solidFill>
-            <a:schemeClr val="accent4">
-              <a:lumMod val="60000"/>
-              <a:lumOff val="40000"/>
-            </a:schemeClr>
-          </a:solidFill>
-          <a:ln w="19050">
-            <a:solidFill>
-              <a:schemeClr val="accent4">
-                <a:lumMod val="60000"/>
-                <a:lumOff val="40000"/>
-              </a:schemeClr>
-            </a:solidFill>
-          </a:ln>
-          <a:effectLst/>
-        </p:spPr>
-        <p:style>
-          <a:lnRef idx="1">
-            <a:schemeClr val="accent2"/>
-          </a:lnRef>
-          <a:fillRef idx="2">
-            <a:schemeClr val="accent2"/>
-          </a:fillRef>
-          <a:effectRef idx="1">
-            <a:schemeClr val="accent2"/>
-          </a:effectRef>
-          <a:fontRef idx="minor">
-            <a:schemeClr val="dk1"/>
-          </a:fontRef>
-        </p:style>
-        <p:txBody>
-          <a:bodyPr rtlCol="0" anchor="ctr"/>
-          <a:lstStyle/>
-          <a:p>
-            <a:pPr algn="ctr"/>
-            <a:r>
-              <a:rPr lang="en-US" sz="1600" dirty="0">
-                <a:solidFill>
-                  <a:schemeClr val="bg1"/>
-                </a:solidFill>
-              </a:rPr>
-              <a:t>:Model</a:t>
-            </a:r>
-            <a:endParaRPr lang="en-SG" sz="1600" dirty="0">
-              <a:solidFill>
-                <a:schemeClr val="bg1"/>
-              </a:solidFill>
-            </a:endParaRPr>
-          </a:p>
-        </p:txBody>
-      </p:sp>
-      <p:cxnSp>
-        <p:nvCxnSpPr>
-          <p:cNvPr id="64" name="Straight Arrow Connector 63"/>
-          <p:cNvCxnSpPr/>
-          <p:nvPr/>
-        </p:nvCxnSpPr>
-        <p:spPr>
-          <a:xfrm>
-            <a:off x="1653251" y="4495317"/>
-            <a:ext cx="5043123" cy="0"/>
-          </a:xfrm>
-          <a:prstGeom prst="straightConnector1">
-            <a:avLst/>
-          </a:prstGeom>
-          <a:ln w="19050">
-            <a:solidFill>
-              <a:srgbClr val="0070C0"/>
-            </a:solidFill>
-            <a:tailEnd type="arrow"/>
-          </a:ln>
-        </p:spPr>
-        <p:style>
-          <a:lnRef idx="1">
-            <a:schemeClr val="accent1"/>
-          </a:lnRef>
-          <a:fillRef idx="0">
-            <a:schemeClr val="accent1"/>
-          </a:fillRef>
-          <a:effectRef idx="0">
-            <a:schemeClr val="accent1"/>
-          </a:effectRef>
-          <a:fontRef idx="minor">
-            <a:schemeClr val="tx1"/>
-          </a:fontRef>
-        </p:style>
-      </p:cxnSp>
-      <p:sp>
-        <p:nvSpPr>
-          <p:cNvPr id="65" name="Rectangle 64"/>
-          <p:cNvSpPr/>
-          <p:nvPr/>
-        </p:nvSpPr>
-        <p:spPr>
-          <a:xfrm>
-            <a:off x="6687452" y="4467000"/>
-            <a:ext cx="161322" cy="1019400"/>
-          </a:xfrm>
-          <a:prstGeom prst="rect">
-            <a:avLst/>
-          </a:prstGeom>
-          <a:solidFill>
-            <a:srgbClr val="0070C0"/>
-          </a:solidFill>
-          <a:ln>
-            <a:solidFill>
-              <a:srgbClr val="0070C0"/>
-            </a:solidFill>
-          </a:ln>
-          <a:effectLst/>
-        </p:spPr>
-        <p:style>
-          <a:lnRef idx="1">
-            <a:schemeClr val="accent3"/>
-          </a:lnRef>
-          <a:fillRef idx="2">
-            <a:schemeClr val="accent3"/>
-          </a:fillRef>
-          <a:effectRef idx="1">
-            <a:schemeClr val="accent3"/>
-          </a:effectRef>
-          <a:fontRef idx="minor">
-            <a:schemeClr val="dk1"/>
-          </a:fontRef>
-        </p:style>
-        <p:txBody>
-          <a:bodyPr rtlCol="0" anchor="ctr"/>
-          <a:lstStyle/>
-          <a:p>
-            <a:pPr algn="ctr"/>
-            <a:endParaRPr lang="en-SG" sz="1400"/>
-          </a:p>
-        </p:txBody>
-      </p:sp>
-      <p:cxnSp>
-        <p:nvCxnSpPr>
-          <p:cNvPr id="71" name="Straight Connector 70"/>
-          <p:cNvCxnSpPr/>
-          <p:nvPr/>
-        </p:nvCxnSpPr>
-        <p:spPr>
-          <a:xfrm>
-            <a:off x="8781148" y="2700858"/>
-            <a:ext cx="0" cy="2830598"/>
-          </a:xfrm>
-          <a:prstGeom prst="line">
-            <a:avLst/>
-          </a:prstGeom>
-          <a:ln w="19050">
-            <a:solidFill>
-              <a:schemeClr val="accent4">
-                <a:lumMod val="60000"/>
-                <a:lumOff val="40000"/>
-              </a:schemeClr>
-            </a:solidFill>
-            <a:prstDash val="sysDash"/>
-          </a:ln>
-          <a:effectLst/>
-        </p:spPr>
-        <p:style>
-          <a:lnRef idx="1">
-            <a:schemeClr val="accent1"/>
-          </a:lnRef>
-          <a:fillRef idx="2">
-            <a:schemeClr val="accent1"/>
-          </a:fillRef>
-          <a:effectRef idx="1">
-            <a:schemeClr val="accent1"/>
-          </a:effectRef>
-          <a:fontRef idx="minor">
-            <a:schemeClr val="dk1"/>
-          </a:fontRef>
-        </p:style>
-      </p:cxnSp>
-      <p:sp>
-        <p:nvSpPr>
-          <p:cNvPr id="73" name="Rectangle 72"/>
-          <p:cNvSpPr/>
-          <p:nvPr/>
-        </p:nvSpPr>
-        <p:spPr>
-          <a:xfrm>
-            <a:off x="8686800" y="4524597"/>
-            <a:ext cx="152400" cy="199803"/>
-          </a:xfrm>
-          <a:prstGeom prst="rect">
-            <a:avLst/>
-          </a:prstGeom>
-          <a:solidFill>
-            <a:schemeClr val="accent4">
-              <a:lumMod val="60000"/>
-              <a:lumOff val="40000"/>
-            </a:schemeClr>
-          </a:solidFill>
-          <a:ln>
-            <a:solidFill>
-              <a:schemeClr val="accent4">
-                <a:lumMod val="60000"/>
-                <a:lumOff val="40000"/>
-              </a:schemeClr>
-            </a:solidFill>
-          </a:ln>
-          <a:effectLst/>
-        </p:spPr>
-        <p:style>
-          <a:lnRef idx="1">
-            <a:schemeClr val="accent3"/>
-          </a:lnRef>
-          <a:fillRef idx="2">
-            <a:schemeClr val="accent3"/>
-          </a:fillRef>
-          <a:effectRef idx="1">
-            <a:schemeClr val="accent3"/>
-          </a:effectRef>
-          <a:fontRef idx="minor">
-            <a:schemeClr val="dk1"/>
-          </a:fontRef>
-        </p:style>
-        <p:txBody>
-          <a:bodyPr rtlCol="0" anchor="ctr"/>
-          <a:lstStyle/>
-          <a:p>
-            <a:pPr algn="ctr"/>
-            <a:endParaRPr lang="en-SG" sz="1400">
-              <a:solidFill>
-                <a:schemeClr val="dk1"/>
-              </a:solidFill>
-            </a:endParaRPr>
-          </a:p>
-        </p:txBody>
-      </p:sp>
-      <p:cxnSp>
-        <p:nvCxnSpPr>
-          <p:cNvPr id="75" name="Straight Arrow Connector 74"/>
-          <p:cNvCxnSpPr/>
-          <p:nvPr/>
-        </p:nvCxnSpPr>
-        <p:spPr>
-          <a:xfrm>
-            <a:off x="6850663" y="4524597"/>
-            <a:ext cx="1836137" cy="0"/>
-          </a:xfrm>
-          <a:prstGeom prst="straightConnector1">
-            <a:avLst/>
-          </a:prstGeom>
-          <a:ln w="19050">
-            <a:solidFill>
-              <a:srgbClr val="0070C0"/>
-            </a:solidFill>
-            <a:tailEnd type="arrow"/>
-          </a:ln>
-        </p:spPr>
-        <p:style>
-          <a:lnRef idx="1">
-            <a:schemeClr val="accent1"/>
-          </a:lnRef>
-          <a:fillRef idx="0">
-            <a:schemeClr val="accent1"/>
-          </a:fillRef>
-          <a:effectRef idx="0">
-            <a:schemeClr val="accent1"/>
-          </a:effectRef>
-          <a:fontRef idx="minor">
-            <a:schemeClr val="tx1"/>
-          </a:fontRef>
-        </p:style>
-      </p:cxnSp>
-      <p:cxnSp>
-        <p:nvCxnSpPr>
-          <p:cNvPr id="76" name="Straight Arrow Connector 75"/>
-          <p:cNvCxnSpPr/>
-          <p:nvPr/>
-        </p:nvCxnSpPr>
-        <p:spPr>
-          <a:xfrm flipV="1">
-            <a:off x="6848774" y="4714650"/>
-            <a:ext cx="1838026" cy="9750"/>
-          </a:xfrm>
-          <a:prstGeom prst="straightConnector1">
-            <a:avLst/>
-          </a:prstGeom>
-          <a:ln w="19050">
-            <a:solidFill>
-              <a:schemeClr val="accent4">
-                <a:lumMod val="60000"/>
-                <a:lumOff val="40000"/>
-              </a:schemeClr>
-            </a:solidFill>
-            <a:prstDash val="sysDash"/>
-            <a:headEnd type="arrow" w="med" len="med"/>
-            <a:tailEnd type="none" w="med" len="med"/>
-          </a:ln>
-        </p:spPr>
-        <p:style>
-          <a:lnRef idx="1">
-            <a:schemeClr val="accent1"/>
-          </a:lnRef>
-          <a:fillRef idx="0">
-            <a:schemeClr val="accent1"/>
-          </a:fillRef>
-          <a:effectRef idx="0">
-            <a:schemeClr val="accent1"/>
-          </a:effectRef>
-          <a:fontRef idx="minor">
-            <a:schemeClr val="tx1"/>
-          </a:fontRef>
-        </p:style>
-      </p:cxnSp>
-      <p:cxnSp>
-        <p:nvCxnSpPr>
-          <p:cNvPr id="77" name="Straight Arrow Connector 76"/>
-          <p:cNvCxnSpPr/>
-          <p:nvPr/>
-        </p:nvCxnSpPr>
-        <p:spPr>
-          <a:xfrm>
-            <a:off x="1653251" y="5486400"/>
-            <a:ext cx="5052349" cy="0"/>
-          </a:xfrm>
-          <a:prstGeom prst="straightConnector1">
-            <a:avLst/>
-          </a:prstGeom>
-          <a:ln w="19050">
-            <a:solidFill>
-              <a:srgbClr val="0070C0"/>
-            </a:solidFill>
-            <a:prstDash val="sysDash"/>
-            <a:headEnd type="arrow" w="med" len="med"/>
-            <a:tailEnd type="none" w="med" len="med"/>
-          </a:ln>
-        </p:spPr>
-        <p:style>
-          <a:lnRef idx="1">
-            <a:schemeClr val="accent1"/>
-          </a:lnRef>
-          <a:fillRef idx="0">
-            <a:schemeClr val="accent1"/>
-          </a:fillRef>
-          <a:effectRef idx="0">
-            <a:schemeClr val="accent1"/>
-          </a:effectRef>
-          <a:fontRef idx="minor">
-            <a:schemeClr val="tx1"/>
-          </a:fontRef>
-        </p:style>
-      </p:cxnSp>
-      <p:sp>
-        <p:nvSpPr>
-          <p:cNvPr id="78" name="TextBox 77"/>
-          <p:cNvSpPr txBox="1"/>
-          <p:nvPr/>
-        </p:nvSpPr>
-        <p:spPr>
-          <a:xfrm>
-            <a:off x="6984957" y="4267200"/>
-            <a:ext cx="1424846" cy="215444"/>
-          </a:xfrm>
-          <a:prstGeom prst="rect">
-            <a:avLst/>
-          </a:prstGeom>
-          <a:noFill/>
-        </p:spPr>
-        <p:txBody>
-          <a:bodyPr wrap="square" lIns="0" tIns="0" rIns="0" bIns="0" rtlCol="0">
-            <a:spAutoFit/>
-          </a:bodyPr>
-          <a:lstStyle>
-            <a:defPPr>
-              <a:defRPr lang="en-US"/>
-            </a:defPPr>
-            <a:lvl1pPr algn="r">
-              <a:defRPr sz="1400">
-                <a:solidFill>
-                  <a:srgbClr val="0070C0"/>
-                </a:solidFill>
-              </a:defRPr>
-            </a:lvl1pPr>
-          </a:lstStyle>
-          <a:p>
-            <a:r>
-              <a:rPr lang="en-US" dirty="0" err="1">
-                <a:solidFill>
-                  <a:srgbClr val="7030A0"/>
-                </a:solidFill>
-              </a:rPr>
-              <a:t>deletePerson</a:t>
-            </a:r>
-            <a:r>
-              <a:rPr lang="en-US" dirty="0">
-                <a:solidFill>
-                  <a:srgbClr val="7030A0"/>
-                </a:solidFill>
-              </a:rPr>
-              <a:t>(p)</a:t>
-            </a:r>
-          </a:p>
-        </p:txBody>
-      </p:sp>
-      <p:sp>
-        <p:nvSpPr>
-          <p:cNvPr id="79" name="TextBox 78"/>
-          <p:cNvSpPr txBox="1"/>
-          <p:nvPr/>
-        </p:nvSpPr>
-        <p:spPr>
-          <a:xfrm>
-            <a:off x="3847551" y="3657600"/>
-            <a:ext cx="767033" cy="184666"/>
-          </a:xfrm>
-          <a:prstGeom prst="rect">
-            <a:avLst/>
-          </a:prstGeom>
-          <a:noFill/>
-        </p:spPr>
-        <p:txBody>
-          <a:bodyPr wrap="square" lIns="0" tIns="0" rIns="0" bIns="0" rtlCol="0">
-            <a:spAutoFit/>
-          </a:bodyPr>
-          <a:lstStyle>
-            <a:defPPr>
-              <a:defRPr lang="en-US"/>
-            </a:defPPr>
-            <a:lvl1pPr algn="r">
-              <a:defRPr sz="1400">
-                <a:solidFill>
-                  <a:srgbClr val="0070C0"/>
-                </a:solidFill>
-              </a:defRPr>
-            </a:lvl1pPr>
-          </a:lstStyle>
-          <a:p>
-            <a:r>
-              <a:rPr lang="en-US" sz="1200" dirty="0"/>
-              <a:t>parse(“1”)</a:t>
-            </a:r>
-          </a:p>
-        </p:txBody>
-      </p:sp>
-      <p:sp>
-        <p:nvSpPr>
-          <p:cNvPr id="80" name="TextBox 79"/>
-          <p:cNvSpPr txBox="1"/>
-          <p:nvPr/>
-        </p:nvSpPr>
-        <p:spPr>
-          <a:xfrm>
-            <a:off x="1742982" y="2850922"/>
-            <a:ext cx="1424846" cy="215444"/>
-          </a:xfrm>
-          <a:prstGeom prst="rect">
-            <a:avLst/>
-          </a:prstGeom>
-          <a:noFill/>
-        </p:spPr>
-        <p:txBody>
-          <a:bodyPr wrap="square" lIns="0" tIns="0" rIns="0" bIns="0" rtlCol="0">
-            <a:spAutoFit/>
-          </a:bodyPr>
-          <a:lstStyle>
-            <a:defPPr>
-              <a:defRPr lang="en-US"/>
-            </a:defPPr>
-            <a:lvl1pPr algn="r">
-              <a:defRPr sz="1400">
-                <a:solidFill>
-                  <a:srgbClr val="0070C0"/>
-                </a:solidFill>
-              </a:defRPr>
-            </a:lvl1pPr>
-          </a:lstStyle>
-          <a:p>
-            <a:r>
-              <a:rPr lang="en-US" dirty="0"/>
-              <a:t>parse(“delete 1”)</a:t>
-            </a:r>
-          </a:p>
-        </p:txBody>
-      </p:sp>
-      <p:sp>
-        <p:nvSpPr>
-          <p:cNvPr id="82" name="TextBox 81"/>
-          <p:cNvSpPr txBox="1"/>
-          <p:nvPr/>
-        </p:nvSpPr>
-        <p:spPr>
-          <a:xfrm>
-            <a:off x="4340137" y="5255323"/>
-            <a:ext cx="621216" cy="215444"/>
-          </a:xfrm>
-          <a:prstGeom prst="rect">
-            <a:avLst/>
-          </a:prstGeom>
-          <a:noFill/>
-        </p:spPr>
-        <p:txBody>
-          <a:bodyPr wrap="square" lIns="0" tIns="0" rIns="0" bIns="0" rtlCol="0">
-            <a:spAutoFit/>
-          </a:bodyPr>
-          <a:lstStyle>
-            <a:defPPr>
-              <a:defRPr lang="en-US"/>
-            </a:defPPr>
-            <a:lvl1pPr algn="r">
-              <a:defRPr sz="1400">
-                <a:solidFill>
-                  <a:srgbClr val="0070C0"/>
-                </a:solidFill>
-              </a:defRPr>
-            </a:lvl1pPr>
-          </a:lstStyle>
-          <a:p>
-            <a:r>
-              <a:rPr lang="en-US" dirty="0"/>
-              <a:t>result</a:t>
-            </a:r>
-          </a:p>
-        </p:txBody>
-      </p:sp>
-      <p:sp>
-        <p:nvSpPr>
-          <p:cNvPr id="83" name="TextBox 82"/>
-          <p:cNvSpPr txBox="1"/>
-          <p:nvPr/>
-        </p:nvSpPr>
-        <p:spPr>
-          <a:xfrm>
-            <a:off x="599983" y="5538488"/>
-            <a:ext cx="762000" cy="215444"/>
-          </a:xfrm>
-          <a:prstGeom prst="rect">
-            <a:avLst/>
-          </a:prstGeom>
-          <a:noFill/>
-        </p:spPr>
-        <p:txBody>
-          <a:bodyPr wrap="square" lIns="0" tIns="0" rIns="0" bIns="0" rtlCol="0">
-            <a:spAutoFit/>
-          </a:bodyPr>
-          <a:lstStyle>
-            <a:defPPr>
-              <a:defRPr lang="en-US"/>
-            </a:defPPr>
-            <a:lvl1pPr algn="r">
-              <a:defRPr sz="1400">
-                <a:solidFill>
-                  <a:srgbClr val="0070C0"/>
-                </a:solidFill>
-              </a:defRPr>
-            </a:lvl1pPr>
-          </a:lstStyle>
-          <a:p>
-            <a:r>
-              <a:rPr lang="en-US" dirty="0"/>
-              <a:t>result</a:t>
-            </a:r>
-          </a:p>
-        </p:txBody>
-      </p:sp>
-      <p:sp>
-        <p:nvSpPr>
-          <p:cNvPr id="84" name="Rectangle 62"/>
-          <p:cNvSpPr/>
-          <p:nvPr/>
-        </p:nvSpPr>
-        <p:spPr>
-          <a:xfrm>
-            <a:off x="7020246" y="4777286"/>
-            <a:ext cx="1590354" cy="461538"/>
-          </a:xfrm>
-          <a:prstGeom prst="rect">
-            <a:avLst/>
-          </a:prstGeom>
-          <a:solidFill>
-            <a:srgbClr val="0070C0"/>
-          </a:solidFill>
-          <a:ln w="19050">
-            <a:solidFill>
-              <a:srgbClr val="0070C0"/>
-            </a:solidFill>
-          </a:ln>
-          <a:effectLst/>
-        </p:spPr>
-        <p:style>
-          <a:lnRef idx="1">
-            <a:schemeClr val="accent2"/>
-          </a:lnRef>
-          <a:fillRef idx="2">
-            <a:schemeClr val="accent2"/>
-          </a:fillRef>
-          <a:effectRef idx="1">
-            <a:schemeClr val="accent2"/>
-          </a:effectRef>
-          <a:fontRef idx="minor">
-            <a:schemeClr val="dk1"/>
-          </a:fontRef>
-        </p:style>
-        <p:txBody>
-          <a:bodyPr rtlCol="0" anchor="ctr"/>
-          <a:lstStyle/>
-          <a:p>
-            <a:pPr algn="ctr"/>
-            <a:r>
-              <a:rPr lang="en-US" sz="1600" dirty="0" err="1">
-                <a:solidFill>
-                  <a:schemeClr val="bg1"/>
-                </a:solidFill>
-              </a:rPr>
-              <a:t>result:Command</a:t>
-            </a:r>
-            <a:r>
-              <a:rPr lang="en-US" sz="1600" dirty="0">
-                <a:solidFill>
-                  <a:schemeClr val="bg1"/>
-                </a:solidFill>
-              </a:rPr>
-              <a:t> Result</a:t>
-            </a:r>
-            <a:endParaRPr lang="en-SG" sz="1600" dirty="0">
-              <a:solidFill>
-                <a:schemeClr val="bg1"/>
-              </a:solidFill>
-            </a:endParaRPr>
-          </a:p>
-        </p:txBody>
-      </p:sp>
-      <p:sp>
-        <p:nvSpPr>
-          <p:cNvPr id="86" name="Rectangle 85"/>
-          <p:cNvSpPr/>
-          <p:nvPr/>
-        </p:nvSpPr>
-        <p:spPr>
-          <a:xfrm>
-            <a:off x="7777323" y="5238824"/>
-            <a:ext cx="152400" cy="171376"/>
-          </a:xfrm>
-          <a:prstGeom prst="rect">
-            <a:avLst/>
-          </a:prstGeom>
-          <a:solidFill>
-            <a:srgbClr val="0070C0"/>
-          </a:solidFill>
-          <a:ln>
-            <a:solidFill>
-              <a:srgbClr val="0070C0"/>
-            </a:solidFill>
-          </a:ln>
-          <a:effectLst/>
-        </p:spPr>
-        <p:style>
-          <a:lnRef idx="1">
-            <a:schemeClr val="accent3"/>
-          </a:lnRef>
-          <a:fillRef idx="2">
-            <a:schemeClr val="accent3"/>
-          </a:fillRef>
-          <a:effectRef idx="1">
-            <a:schemeClr val="accent3"/>
-          </a:effectRef>
-          <a:fontRef idx="minor">
-            <a:schemeClr val="dk1"/>
-          </a:fontRef>
-        </p:style>
-        <p:txBody>
-          <a:bodyPr rtlCol="0" anchor="ctr"/>
-          <a:lstStyle/>
-          <a:p>
-            <a:pPr algn="ctr"/>
-            <a:endParaRPr lang="en-SG" sz="1400"/>
-          </a:p>
-        </p:txBody>
-      </p:sp>
-      <p:cxnSp>
-        <p:nvCxnSpPr>
-          <p:cNvPr id="90" name="Straight Arrow Connector 89"/>
-          <p:cNvCxnSpPr/>
-          <p:nvPr/>
-        </p:nvCxnSpPr>
-        <p:spPr>
-          <a:xfrm>
-            <a:off x="6858000" y="5410200"/>
-            <a:ext cx="966624" cy="0"/>
-          </a:xfrm>
-          <a:prstGeom prst="straightConnector1">
-            <a:avLst/>
-          </a:prstGeom>
-          <a:ln w="19050">
-            <a:solidFill>
-              <a:srgbClr val="0070C0"/>
-            </a:solidFill>
-            <a:prstDash val="sysDash"/>
-            <a:headEnd type="arrow" w="med" len="med"/>
-            <a:tailEnd type="none" w="med" len="med"/>
-          </a:ln>
-        </p:spPr>
-        <p:style>
-          <a:lnRef idx="1">
-            <a:schemeClr val="accent1"/>
-          </a:lnRef>
-          <a:fillRef idx="0">
-            <a:schemeClr val="accent1"/>
-          </a:fillRef>
-          <a:effectRef idx="0">
-            <a:schemeClr val="accent1"/>
-          </a:effectRef>
-          <a:fontRef idx="minor">
-            <a:schemeClr val="tx1"/>
-          </a:fontRef>
-        </p:style>
-      </p:cxnSp>
-      <p:sp>
-        <p:nvSpPr>
-          <p:cNvPr id="93" name="TextBox 92"/>
-          <p:cNvSpPr txBox="1"/>
-          <p:nvPr/>
-        </p:nvSpPr>
-        <p:spPr>
-          <a:xfrm>
-            <a:off x="2673845" y="4027787"/>
-            <a:ext cx="220343" cy="215444"/>
-          </a:xfrm>
-          <a:prstGeom prst="rect">
-            <a:avLst/>
-          </a:prstGeom>
-          <a:noFill/>
-        </p:spPr>
-        <p:txBody>
-          <a:bodyPr wrap="square" lIns="0" tIns="0" rIns="0" bIns="0" rtlCol="0">
-            <a:spAutoFit/>
-          </a:bodyPr>
-          <a:lstStyle>
-            <a:defPPr>
-              <a:defRPr lang="en-US"/>
-            </a:defPPr>
-            <a:lvl1pPr algn="r">
-              <a:defRPr sz="1400">
-                <a:solidFill>
-                  <a:srgbClr val="0070C0"/>
-                </a:solidFill>
-              </a:defRPr>
-            </a:lvl1pPr>
-          </a:lstStyle>
-          <a:p>
-            <a:r>
-              <a:rPr lang="en-US" dirty="0"/>
-              <a:t>d</a:t>
-            </a:r>
-          </a:p>
-        </p:txBody>
-      </p:sp>
-      <p:sp>
-        <p:nvSpPr>
-          <p:cNvPr id="40" name="Rectangle 62"/>
-          <p:cNvSpPr/>
-          <p:nvPr/>
-        </p:nvSpPr>
-        <p:spPr>
-          <a:xfrm>
-            <a:off x="4231981" y="2929839"/>
-            <a:ext cx="1778201" cy="432035"/>
-          </a:xfrm>
-          <a:prstGeom prst="rect">
-            <a:avLst/>
-          </a:prstGeom>
-          <a:solidFill>
-            <a:srgbClr val="0070C0"/>
-          </a:solidFill>
-          <a:ln w="19050">
-            <a:solidFill>
-              <a:srgbClr val="0070C0"/>
-            </a:solidFill>
-          </a:ln>
-          <a:effectLst/>
-        </p:spPr>
-        <p:style>
-          <a:lnRef idx="1">
-            <a:schemeClr val="accent2"/>
-          </a:lnRef>
-          <a:fillRef idx="2">
-            <a:schemeClr val="accent2"/>
-          </a:fillRef>
-          <a:effectRef idx="1">
-            <a:schemeClr val="accent2"/>
-          </a:effectRef>
-          <a:fontRef idx="minor">
-            <a:schemeClr val="dk1"/>
-          </a:fontRef>
-        </p:style>
-        <p:txBody>
-          <a:bodyPr rtlCol="0" anchor="ctr"/>
-          <a:lstStyle/>
-          <a:p>
-            <a:pPr algn="ctr"/>
-            <a:r>
-              <a:rPr lang="en-US" sz="1600" dirty="0">
-                <a:solidFill>
-                  <a:schemeClr val="bg1"/>
-                </a:solidFill>
-              </a:rPr>
-              <a:t>:</a:t>
-            </a:r>
-            <a:r>
-              <a:rPr lang="en-US" sz="1600" dirty="0" err="1">
-                <a:solidFill>
-                  <a:schemeClr val="bg1"/>
-                </a:solidFill>
-              </a:rPr>
-              <a:t>DeleteCommand</a:t>
-            </a:r>
-            <a:endParaRPr lang="en-US" sz="1600" dirty="0">
-              <a:solidFill>
-                <a:schemeClr val="bg1"/>
-              </a:solidFill>
-            </a:endParaRPr>
-          </a:p>
-          <a:p>
-            <a:pPr algn="ctr"/>
-            <a:r>
-              <a:rPr lang="en-US" sz="1600" dirty="0">
-                <a:solidFill>
-                  <a:schemeClr val="bg1"/>
-                </a:solidFill>
-              </a:rPr>
-              <a:t>Parser</a:t>
-            </a:r>
-            <a:endParaRPr lang="en-SG" sz="1600" dirty="0">
-              <a:solidFill>
-                <a:schemeClr val="bg1"/>
-              </a:solidFill>
-            </a:endParaRPr>
-          </a:p>
-        </p:txBody>
-      </p:sp>
-      <p:cxnSp>
-        <p:nvCxnSpPr>
-          <p:cNvPr id="8" name="Straight Arrow Connector 7"/>
-          <p:cNvCxnSpPr/>
-          <p:nvPr/>
-        </p:nvCxnSpPr>
-        <p:spPr>
-          <a:xfrm>
-            <a:off x="3462591" y="3657600"/>
-            <a:ext cx="1597356" cy="1"/>
-          </a:xfrm>
-          <a:prstGeom prst="straightConnector1">
-            <a:avLst/>
-          </a:prstGeom>
-          <a:ln w="19050">
-            <a:headEnd type="none" w="med" len="med"/>
-            <a:tailEnd type="arrow" w="med" len="med"/>
-          </a:ln>
-        </p:spPr>
-        <p:style>
-          <a:lnRef idx="1">
-            <a:schemeClr val="accent1"/>
-          </a:lnRef>
-          <a:fillRef idx="0">
-            <a:schemeClr val="accent1"/>
-          </a:fillRef>
-          <a:effectRef idx="0">
-            <a:schemeClr val="accent1"/>
-          </a:effectRef>
-          <a:fontRef idx="minor">
-            <a:schemeClr val="tx1"/>
-          </a:fontRef>
-        </p:style>
-      </p:cxnSp>
-      <p:sp>
-        <p:nvSpPr>
-          <p:cNvPr id="45" name="Rectangle 44"/>
-          <p:cNvSpPr/>
-          <p:nvPr/>
-        </p:nvSpPr>
-        <p:spPr>
-          <a:xfrm>
-            <a:off x="5059947" y="3352800"/>
-            <a:ext cx="205843" cy="123165"/>
-          </a:xfrm>
-          <a:prstGeom prst="rect">
-            <a:avLst/>
-          </a:prstGeom>
-          <a:solidFill>
-            <a:srgbClr val="0070C0"/>
-          </a:solidFill>
-          <a:ln>
-            <a:solidFill>
-              <a:srgbClr val="0070C0"/>
-            </a:solidFill>
-          </a:ln>
-          <a:effectLst/>
-        </p:spPr>
-        <p:style>
-          <a:lnRef idx="1">
-            <a:schemeClr val="accent3"/>
-          </a:lnRef>
-          <a:fillRef idx="2">
-            <a:schemeClr val="accent3"/>
-          </a:fillRef>
-          <a:effectRef idx="1">
-            <a:schemeClr val="accent3"/>
-          </a:effectRef>
-          <a:fontRef idx="minor">
-            <a:schemeClr val="dk1"/>
-          </a:fontRef>
-        </p:style>
-        <p:txBody>
-          <a:bodyPr rtlCol="0" anchor="ctr"/>
-          <a:lstStyle/>
-          <a:p>
-            <a:pPr algn="ctr"/>
-            <a:endParaRPr lang="en-SG" sz="1400"/>
-          </a:p>
-        </p:txBody>
-      </p:sp>
-      <p:cxnSp>
-        <p:nvCxnSpPr>
-          <p:cNvPr id="46" name="Straight Connector 45"/>
-          <p:cNvCxnSpPr>
-            <a:stCxn id="45" idx="0"/>
-          </p:cNvCxnSpPr>
-          <p:nvPr/>
-        </p:nvCxnSpPr>
-        <p:spPr>
-          <a:xfrm>
-            <a:off x="5162869" y="3352800"/>
-            <a:ext cx="0" cy="990600"/>
-          </a:xfrm>
-          <a:prstGeom prst="line">
-            <a:avLst/>
-          </a:prstGeom>
-          <a:ln w="19050">
-            <a:solidFill>
-              <a:srgbClr val="0070C0"/>
-            </a:solidFill>
-            <a:prstDash val="sysDash"/>
-          </a:ln>
-          <a:effectLst/>
-        </p:spPr>
-        <p:style>
-          <a:lnRef idx="1">
-            <a:schemeClr val="accent1"/>
-          </a:lnRef>
-          <a:fillRef idx="2">
-            <a:schemeClr val="accent1"/>
-          </a:fillRef>
-          <a:effectRef idx="1">
-            <a:schemeClr val="accent1"/>
-          </a:effectRef>
-          <a:fontRef idx="minor">
-            <a:schemeClr val="dk1"/>
-          </a:fontRef>
-        </p:style>
-      </p:cxnSp>
-      <p:sp>
-        <p:nvSpPr>
-          <p:cNvPr id="49" name="Rectangle 48"/>
-          <p:cNvSpPr/>
-          <p:nvPr/>
-        </p:nvSpPr>
-        <p:spPr>
-          <a:xfrm>
-            <a:off x="5059947" y="3657601"/>
-            <a:ext cx="205843" cy="533400"/>
-          </a:xfrm>
-          <a:prstGeom prst="rect">
-            <a:avLst/>
-          </a:prstGeom>
-          <a:solidFill>
-            <a:srgbClr val="0070C0"/>
-          </a:solidFill>
-          <a:ln>
-            <a:solidFill>
-              <a:srgbClr val="0070C0"/>
-            </a:solidFill>
-          </a:ln>
-          <a:effectLst/>
-        </p:spPr>
-        <p:style>
-          <a:lnRef idx="1">
-            <a:schemeClr val="accent3"/>
-          </a:lnRef>
-          <a:fillRef idx="2">
-            <a:schemeClr val="accent3"/>
-          </a:fillRef>
-          <a:effectRef idx="1">
-            <a:schemeClr val="accent3"/>
-          </a:effectRef>
-          <a:fontRef idx="minor">
-            <a:schemeClr val="dk1"/>
-          </a:fontRef>
-        </p:style>
-        <p:txBody>
-          <a:bodyPr rtlCol="0" anchor="ctr"/>
-          <a:lstStyle/>
-          <a:p>
-            <a:pPr algn="ctr"/>
-            <a:endParaRPr lang="en-SG" sz="1400"/>
-          </a:p>
-        </p:txBody>
-      </p:sp>
-      <p:cxnSp>
-        <p:nvCxnSpPr>
-          <p:cNvPr id="51" name="Straight Arrow Connector 50"/>
-          <p:cNvCxnSpPr/>
-          <p:nvPr/>
-        </p:nvCxnSpPr>
-        <p:spPr>
-          <a:xfrm>
-            <a:off x="3499382" y="4185073"/>
-            <a:ext cx="1667219" cy="0"/>
-          </a:xfrm>
-          <a:prstGeom prst="straightConnector1">
-            <a:avLst/>
-          </a:prstGeom>
-          <a:ln w="19050">
-            <a:solidFill>
-              <a:srgbClr val="0070C0"/>
-            </a:solidFill>
-            <a:prstDash val="sysDash"/>
-            <a:headEnd type="arrow" w="med" len="med"/>
-            <a:tailEnd type="none" w="med" len="med"/>
-          </a:ln>
-        </p:spPr>
-        <p:style>
-          <a:lnRef idx="1">
-            <a:schemeClr val="accent1"/>
-          </a:lnRef>
-          <a:fillRef idx="0">
-            <a:schemeClr val="accent1"/>
-          </a:fillRef>
-          <a:effectRef idx="0">
-            <a:schemeClr val="accent1"/>
-          </a:effectRef>
-          <a:fontRef idx="minor">
-            <a:schemeClr val="tx1"/>
-          </a:fontRef>
-        </p:style>
-      </p:cxnSp>
-      <p:cxnSp>
-        <p:nvCxnSpPr>
-          <p:cNvPr id="13" name="Straight Arrow Connector 12"/>
-          <p:cNvCxnSpPr/>
-          <p:nvPr/>
-        </p:nvCxnSpPr>
-        <p:spPr>
-          <a:xfrm>
-            <a:off x="6858000" y="5029200"/>
-            <a:ext cx="162246" cy="0"/>
-          </a:xfrm>
-          <a:prstGeom prst="straightConnector1">
-            <a:avLst/>
-          </a:prstGeom>
-          <a:ln w="19050">
-            <a:headEnd type="none" w="med" len="med"/>
-            <a:tailEnd type="arrow" w="med" len="med"/>
-          </a:ln>
-        </p:spPr>
-        <p:style>
-          <a:lnRef idx="1">
-            <a:schemeClr val="accent1"/>
-          </a:lnRef>
-          <a:fillRef idx="0">
-            <a:schemeClr val="accent1"/>
-          </a:fillRef>
-          <a:effectRef idx="0">
-            <a:schemeClr val="accent1"/>
-          </a:effectRef>
-          <a:fontRef idx="minor">
-            <a:schemeClr val="tx1"/>
-          </a:fontRef>
-        </p:style>
-      </p:cxnSp>
-      <p:cxnSp>
-        <p:nvCxnSpPr>
-          <p:cNvPr id="50" name="Straight Arrow Connector 49"/>
-          <p:cNvCxnSpPr/>
-          <p:nvPr/>
-        </p:nvCxnSpPr>
-        <p:spPr>
-          <a:xfrm>
-            <a:off x="3412425" y="3173004"/>
-            <a:ext cx="819556" cy="1"/>
-          </a:xfrm>
-          <a:prstGeom prst="straightConnector1">
-            <a:avLst/>
-          </a:prstGeom>
-          <a:ln w="19050">
-            <a:solidFill>
-              <a:srgbClr val="0070C0"/>
-            </a:solidFill>
-            <a:tailEnd type="arrow"/>
-          </a:ln>
-        </p:spPr>
-        <p:style>
-          <a:lnRef idx="1">
-            <a:schemeClr val="accent1"/>
-          </a:lnRef>
-          <a:fillRef idx="0">
-            <a:schemeClr val="accent1"/>
-          </a:fillRef>
-          <a:effectRef idx="0">
-            <a:schemeClr val="accent1"/>
-          </a:effectRef>
-          <a:fontRef idx="minor">
-            <a:schemeClr val="tx1"/>
-          </a:fontRef>
-        </p:style>
-      </p:cxnSp>
-      <p:cxnSp>
-        <p:nvCxnSpPr>
-          <p:cNvPr id="52" name="Straight Arrow Connector 51"/>
-          <p:cNvCxnSpPr/>
-          <p:nvPr/>
-        </p:nvCxnSpPr>
-        <p:spPr>
-          <a:xfrm>
-            <a:off x="3459519" y="3475965"/>
-            <a:ext cx="1600428" cy="0"/>
-          </a:xfrm>
-          <a:prstGeom prst="straightConnector1">
-            <a:avLst/>
-          </a:prstGeom>
-          <a:ln w="19050">
-            <a:solidFill>
-              <a:srgbClr val="0070C0"/>
-            </a:solidFill>
-            <a:prstDash val="sysDash"/>
-            <a:headEnd type="arrow" w="med" len="med"/>
-            <a:tailEnd type="none" w="med" len="med"/>
-          </a:ln>
-        </p:spPr>
-        <p:style>
-          <a:lnRef idx="1">
-            <a:schemeClr val="accent1"/>
-          </a:lnRef>
-          <a:fillRef idx="0">
-            <a:schemeClr val="accent1"/>
-          </a:fillRef>
-          <a:effectRef idx="0">
-            <a:schemeClr val="accent1"/>
-          </a:effectRef>
-          <a:fontRef idx="minor">
-            <a:schemeClr val="tx1"/>
-          </a:fontRef>
-        </p:style>
-      </p:cxnSp>
-      <p:sp>
-        <p:nvSpPr>
-          <p:cNvPr id="4" name="TextBox 3"/>
-          <p:cNvSpPr txBox="1"/>
-          <p:nvPr/>
-        </p:nvSpPr>
-        <p:spPr>
-          <a:xfrm>
-            <a:off x="5033665" y="4199590"/>
-            <a:ext cx="258404" cy="261610"/>
-          </a:xfrm>
-          <a:prstGeom prst="rect">
-            <a:avLst/>
-          </a:prstGeom>
-          <a:noFill/>
-        </p:spPr>
-        <p:txBody>
-          <a:bodyPr wrap="none" rtlCol="0">
-            <a:spAutoFit/>
-          </a:bodyPr>
-          <a:lstStyle/>
-          <a:p>
-            <a:r>
-              <a:rPr lang="en-SG" sz="1100" dirty="0">
-                <a:solidFill>
-                  <a:srgbClr val="002060"/>
-                </a:solidFill>
-              </a:rPr>
-              <a:t>X</a:t>
-            </a:r>
-          </a:p>
-        </p:txBody>
-      </p:sp>
+      </p:pic>
     </p:spTree>
     <p:extLst>
       <p:ext uri="{BB962C8B-B14F-4D97-AF65-F5344CB8AC3E}">

</xml_diff>